<commit_message>
v1.1: updated energy costs for EUR edition
</commit_message>
<xml_diff>
--- a/tesla_model_s_handout_eur.pptx
+++ b/tesla_model_s_handout_eur.pptx
@@ -290,7 +290,7 @@
             <a:fld id="{63BB9708-3311-2149-A02D-BFA98F482279}" type="datetimeFigureOut">
               <a:rPr lang="de-DE" smtClean="0"/>
               <a:pPr/>
-              <a:t>05.08.2014</a:t>
+              <a:t>07.08.2014</a:t>
             </a:fld>
             <a:endParaRPr lang="de-DE"/>
           </a:p>
@@ -457,7 +457,7 @@
             <a:fld id="{63BB9708-3311-2149-A02D-BFA98F482279}" type="datetimeFigureOut">
               <a:rPr lang="de-DE" smtClean="0"/>
               <a:pPr/>
-              <a:t>05.08.2014</a:t>
+              <a:t>07.08.2014</a:t>
             </a:fld>
             <a:endParaRPr lang="de-DE"/>
           </a:p>
@@ -634,7 +634,7 @@
             <a:fld id="{63BB9708-3311-2149-A02D-BFA98F482279}" type="datetimeFigureOut">
               <a:rPr lang="de-DE" smtClean="0"/>
               <a:pPr/>
-              <a:t>05.08.2014</a:t>
+              <a:t>07.08.2014</a:t>
             </a:fld>
             <a:endParaRPr lang="de-DE"/>
           </a:p>
@@ -801,7 +801,7 @@
             <a:fld id="{63BB9708-3311-2149-A02D-BFA98F482279}" type="datetimeFigureOut">
               <a:rPr lang="de-DE" smtClean="0"/>
               <a:pPr/>
-              <a:t>05.08.2014</a:t>
+              <a:t>07.08.2014</a:t>
             </a:fld>
             <a:endParaRPr lang="de-DE"/>
           </a:p>
@@ -1044,7 +1044,7 @@
             <a:fld id="{63BB9708-3311-2149-A02D-BFA98F482279}" type="datetimeFigureOut">
               <a:rPr lang="de-DE" smtClean="0"/>
               <a:pPr/>
-              <a:t>05.08.2014</a:t>
+              <a:t>07.08.2014</a:t>
             </a:fld>
             <a:endParaRPr lang="de-DE"/>
           </a:p>
@@ -1329,7 +1329,7 @@
             <a:fld id="{63BB9708-3311-2149-A02D-BFA98F482279}" type="datetimeFigureOut">
               <a:rPr lang="de-DE" smtClean="0"/>
               <a:pPr/>
-              <a:t>05.08.2014</a:t>
+              <a:t>07.08.2014</a:t>
             </a:fld>
             <a:endParaRPr lang="de-DE"/>
           </a:p>
@@ -1748,7 +1748,7 @@
             <a:fld id="{63BB9708-3311-2149-A02D-BFA98F482279}" type="datetimeFigureOut">
               <a:rPr lang="de-DE" smtClean="0"/>
               <a:pPr/>
-              <a:t>05.08.2014</a:t>
+              <a:t>07.08.2014</a:t>
             </a:fld>
             <a:endParaRPr lang="de-DE"/>
           </a:p>
@@ -1863,7 +1863,7 @@
             <a:fld id="{63BB9708-3311-2149-A02D-BFA98F482279}" type="datetimeFigureOut">
               <a:rPr lang="de-DE" smtClean="0"/>
               <a:pPr/>
-              <a:t>05.08.2014</a:t>
+              <a:t>07.08.2014</a:t>
             </a:fld>
             <a:endParaRPr lang="de-DE"/>
           </a:p>
@@ -1955,7 +1955,7 @@
             <a:fld id="{63BB9708-3311-2149-A02D-BFA98F482279}" type="datetimeFigureOut">
               <a:rPr lang="de-DE" smtClean="0"/>
               <a:pPr/>
-              <a:t>05.08.2014</a:t>
+              <a:t>07.08.2014</a:t>
             </a:fld>
             <a:endParaRPr lang="de-DE"/>
           </a:p>
@@ -2229,7 +2229,7 @@
             <a:fld id="{63BB9708-3311-2149-A02D-BFA98F482279}" type="datetimeFigureOut">
               <a:rPr lang="de-DE" smtClean="0"/>
               <a:pPr/>
-              <a:t>05.08.2014</a:t>
+              <a:t>07.08.2014</a:t>
             </a:fld>
             <a:endParaRPr lang="de-DE"/>
           </a:p>
@@ -2479,7 +2479,7 @@
             <a:fld id="{63BB9708-3311-2149-A02D-BFA98F482279}" type="datetimeFigureOut">
               <a:rPr lang="de-DE" smtClean="0"/>
               <a:pPr/>
-              <a:t>05.08.2014</a:t>
+              <a:t>07.08.2014</a:t>
             </a:fld>
             <a:endParaRPr lang="de-DE"/>
           </a:p>
@@ -2689,7 +2689,7 @@
             <a:fld id="{63BB9708-3311-2149-A02D-BFA98F482279}" type="datetimeFigureOut">
               <a:rPr lang="de-DE" smtClean="0"/>
               <a:pPr/>
-              <a:t>05.08.2014</a:t>
+              <a:t>07.08.2014</a:t>
             </a:fld>
             <a:endParaRPr lang="de-DE"/>
           </a:p>
@@ -3223,13 +3223,13 @@
               </a:ext>
             </a:extLst>
           </a:blip>
-          <a:srcRect l="-49272" t="-3215" r="706" b="-7169"/>
+          <a:srcRect l="-38488" t="-4068" r="1874" b="-2192"/>
           <a:stretch/>
         </p:blipFill>
         <p:spPr bwMode="auto">
           <a:xfrm>
-            <a:off x="0" y="5254149"/>
-            <a:ext cx="4384167" cy="1596253"/>
+            <a:off x="7620" y="5235256"/>
+            <a:ext cx="4376547" cy="1611336"/>
           </a:xfrm>
           <a:prstGeom prst="rect">
             <a:avLst/>
@@ -3620,7 +3620,7 @@
           <p:nvPr>
             <p:extLst>
               <p:ext uri="{D42A27DB-BD31-4B8C-83A1-F6EECF244321}">
-                <p14:modId xmlns:p14="http://schemas.microsoft.com/office/powerpoint/2010/main" val="3354254486"/>
+                <p14:modId xmlns:p14="http://schemas.microsoft.com/office/powerpoint/2010/main" val="1908780131"/>
               </p:ext>
             </p:extLst>
           </p:nvPr>
@@ -3787,7 +3787,7 @@
                           </a:solidFill>
                           <a:effectLst/>
                         </a:rPr>
-                        <a:t>1.3</a:t>
+                        <a:t>1.4</a:t>
                       </a:r>
                       <a:endParaRPr lang="en-US" sz="600" b="0" i="1" u="none" strike="noStrike" dirty="0">
                         <a:solidFill>
@@ -3974,7 +3974,7 @@
                           </a:solidFill>
                           <a:effectLst/>
                         </a:rPr>
-                        <a:t>0.28</a:t>
+                        <a:t>0.23</a:t>
                       </a:r>
                       <a:endParaRPr lang="en-US" sz="600" b="0" i="1" u="none" strike="noStrike" dirty="0">
                         <a:solidFill>
@@ -4235,8 +4235,43 @@
                   </a:outerShdw>
                 </a:effectLst>
               </a:rPr>
-              <a:t>Version 1.0</a:t>
-            </a:r>
+              <a:t>Version </a:t>
+            </a:r>
+            <a:r>
+              <a:rPr lang="de-CH" sz="1200" b="1" dirty="0" smtClean="0">
+                <a:ln w="18415" cmpd="sng">
+                  <a:noFill/>
+                  <a:prstDash val="solid"/>
+                </a:ln>
+                <a:solidFill>
+                  <a:srgbClr val="FFFFFF"/>
+                </a:solidFill>
+                <a:effectLst>
+                  <a:outerShdw blurRad="38100" dist="38100" dir="2700000" algn="tl">
+                    <a:srgbClr val="000000">
+                      <a:alpha val="43137"/>
+                    </a:srgbClr>
+                  </a:outerShdw>
+                </a:effectLst>
+              </a:rPr>
+              <a:t>1.1</a:t>
+            </a:r>
+            <a:endParaRPr lang="de-CH" sz="1200" b="1" dirty="0" smtClean="0">
+              <a:ln w="18415" cmpd="sng">
+                <a:noFill/>
+                <a:prstDash val="solid"/>
+              </a:ln>
+              <a:solidFill>
+                <a:srgbClr val="FFFFFF"/>
+              </a:solidFill>
+              <a:effectLst>
+                <a:outerShdw blurRad="38100" dist="38100" dir="2700000" algn="tl">
+                  <a:srgbClr val="000000">
+                    <a:alpha val="43137"/>
+                  </a:srgbClr>
+                </a:outerShdw>
+              </a:effectLst>
+            </a:endParaRPr>
           </a:p>
           <a:p>
             <a:pPr algn="r"/>
@@ -4695,7 +4730,7 @@
         </p:nvSpPr>
         <p:spPr>
           <a:xfrm>
-            <a:off x="3715335" y="5753499"/>
+            <a:off x="3646755" y="5783979"/>
             <a:ext cx="268251" cy="200055"/>
           </a:xfrm>
           <a:prstGeom prst="rect">

</xml_diff>